<commit_message>
changed vector db to chromdb
</commit_message>
<xml_diff>
--- a/generated_presentation.pptx
+++ b/generated_presentation.pptx
@@ -3110,7 +3110,7 @@
           <a:lstStyle/>
           <a:p>
             <a:r>
-              <a:t>Title Slide</a:t>
+              <a:t>Introduction to Graphene and 2D Nanomaterials</a:t>
             </a:r>
           </a:p>
         </p:txBody>
@@ -3131,7 +3131,17 @@
           <a:lstStyle/>
           <a:p>
             <a:r>
-              <a:t>- The study involved the synthesis of ultrathin In4SnS8 nanosheets using a thermal decomposition method, with these sheets exhibiting a thickness of only 3.8 nm. The goal was to explore their potential use in applications such as environmental remediation, solar energy conversion, and advanced optical/electrical nanodevices.</a:t>
+              <a:t>- Advances in graphene technology have spurred the synthesis of various 2D nanomaterials.</a:t>
+            </a:r>
+          </a:p>
+          <a:p>
+            <a:r>
+              <a:t>- Transition metal oxides, metal chalcogenides, and organic compounds are key focus areas.</a:t>
+            </a:r>
+          </a:p>
+          <a:p>
+            <a:r>
+              <a:t>- Simple and effective synthetic methods are still being pursued.</a:t>
             </a:r>
           </a:p>
         </p:txBody>
@@ -3170,7 +3180,7 @@
           <a:lstStyle/>
           <a:p>
             <a:r>
-              <a:t>Introduction &amp; Context</a:t>
+              <a:t>Synthesis Methods for 2D Nanomaterials</a:t>
             </a:r>
           </a:p>
         </p:txBody>
@@ -3191,7 +3201,17 @@
           <a:lstStyle/>
           <a:p>
             <a:r>
-              <a:t>- Ecological outcomes aren't explicitly addressed in this excerpt, but the potential application of the nanosheets in environmental remediation implies a beneficial ecological impact.</a:t>
+              <a:t>- Mechanical and liquid-phase exfoliations.</a:t>
+            </a:r>
+          </a:p>
+          <a:p>
+            <a:r>
+              <a:t>- Ion-intercalation and exfoliation.</a:t>
+            </a:r>
+          </a:p>
+          <a:p>
+            <a:r>
+              <a:t>- Chemical vapor deposition (CVD) and solution-phase chemical syntheses.</a:t>
             </a:r>
           </a:p>
         </p:txBody>
@@ -3230,7 +3250,7 @@
           <a:lstStyle/>
           <a:p>
             <a:r>
-              <a:t>Methods &amp; Study Design</a:t>
+              <a:t>Characterization Techniques</a:t>
             </a:r>
           </a:p>
         </p:txBody>
@@ -3251,7 +3271,17 @@
           <a:lstStyle/>
           <a:p>
             <a:r>
-              <a:t>- The sample size isn't specified in this excerpt, and it's unclear how many times the synthesis process was repeated. Thus, the reliability of the data could be questionable.</a:t>
+              <a:t>- Morphology examined using Tecnai G2 F30 S-Twin transmission electron microscope.</a:t>
+            </a:r>
+          </a:p>
+          <a:p>
+            <a:r>
+              <a:t>- X-ray diffraction patterns recorded with Bruker D8 Advance powder X-ray diffractometer.</a:t>
+            </a:r>
+          </a:p>
+          <a:p>
+            <a:r>
+              <a:t>- X-ray photoelectron spectra using PHI 5000 Versaprobe spectrometer.</a:t>
             </a:r>
           </a:p>
         </p:txBody>
@@ -3290,7 +3320,7 @@
           <a:lstStyle/>
           <a:p>
             <a:r>
-              <a:t>Results &amp; Ecological Outcomes</a:t>
+              <a:t>Synthesis of In4SnS8 Nanosheets</a:t>
             </a:r>
           </a:p>
         </p:txBody>
@@ -3311,7 +3341,17 @@
           <a:lstStyle/>
           <a:p>
             <a:r>
-              <a:t>- The limitations of the study aren't addressed, but a future research direction could involve further exploration of the nanosheets' potential applications. Specifically, research could investigate how the nanosheets perform in environmental remediation, solar energy conversion, and advanced optical/electrical nanodevices.</a:t>
+              <a:t>- Synthesized via a thermal decomposition method.</a:t>
+            </a:r>
+          </a:p>
+          <a:p>
+            <a:r>
+              <a:t>- Utilized Sn(DDTC)4 and In(DDTC)3 in OM solvent.</a:t>
+            </a:r>
+          </a:p>
+          <a:p>
+            <a:r>
+              <a:t>- Temperature control and N2 atmosphere critical in synthesis.</a:t>
             </a:r>
           </a:p>
         </p:txBody>
@@ -3350,7 +3390,7 @@
           <a:lstStyle/>
           <a:p>
             <a:r>
-              <a:t>Data Reliability &amp; Limitations</a:t>
+              <a:t>Adsorption and Photocatalysis Applications</a:t>
             </a:r>
           </a:p>
         </p:txBody>
@@ -3371,7 +3411,17 @@
           <a:lstStyle/>
           <a:p>
             <a:r>
-              <a:t>Content not available or insufficient data.</a:t>
+              <a:t>- In4SnS8 nanosheets treated in acetic acid for surface preparation.</a:t>
+            </a:r>
+          </a:p>
+          <a:p>
+            <a:r>
+              <a:t>- Exhibits fast adsorption and photocatalytic dual function.</a:t>
+            </a:r>
+          </a:p>
+          <a:p>
+            <a:r>
+              <a:t>- Effective for organic dye removal in environmental remediation.</a:t>
             </a:r>
           </a:p>
         </p:txBody>
@@ -3410,7 +3460,7 @@
           <a:lstStyle/>
           <a:p>
             <a:r>
-              <a:t>Recommendations &amp; Future Research</a:t>
+              <a:t>Performance and Efficiency</a:t>
             </a:r>
           </a:p>
         </p:txBody>
@@ -3431,7 +3481,17 @@
           <a:lstStyle/>
           <a:p>
             <a:r>
-              <a:t>Content not available or insufficient data.</a:t>
+              <a:t>- High specific surface area of 40.34 m2 g⁻¹.</a:t>
+            </a:r>
+          </a:p>
+          <a:p>
+            <a:r>
+              <a:t>- Superior to flower-like In4SnS8 microspheres with 24.7 m2 g⁻¹.</a:t>
+            </a:r>
+          </a:p>
+          <a:p>
+            <a:r>
+              <a:t>- Large surface area enhances photocatalytic applications.</a:t>
             </a:r>
           </a:p>
         </p:txBody>
@@ -3470,7 +3530,7 @@
           <a:lstStyle/>
           <a:p>
             <a:r>
-              <a:t>Conclusion</a:t>
+              <a:t>Conclusion and Future Prospects</a:t>
             </a:r>
           </a:p>
         </p:txBody>
@@ -3491,7 +3551,17 @@
           <a:lstStyle/>
           <a:p>
             <a:r>
-              <a:t>Content not available or insufficient data.</a:t>
+              <a:t>- In4SnS8 nanosheets hold potential for environmental remediation and solar energy conversion.</a:t>
+            </a:r>
+          </a:p>
+          <a:p>
+            <a:r>
+              <a:t>- Ongoing research focuses on optimizing synthesis methods and improving efficiency.</a:t>
+            </a:r>
+          </a:p>
+          <a:p>
+            <a:r>
+              <a:t>- Potential applications in advanced optical/electric nanodevices.</a:t>
             </a:r>
           </a:p>
         </p:txBody>

</xml_diff>

<commit_message>
minor changes and structure
</commit_message>
<xml_diff>
--- a/generated_presentation.pptx
+++ b/generated_presentation.pptx
@@ -3110,7 +3110,7 @@
           <a:lstStyle/>
           <a:p>
             <a:r>
-              <a:t>Introduction to Graphene and 2D Nanomaterials</a:t>
+              <a:t>Introduction to In4SnS8 Nanosheets</a:t>
             </a:r>
           </a:p>
         </p:txBody>
@@ -3131,17 +3131,17 @@
           <a:lstStyle/>
           <a:p>
             <a:r>
-              <a:t>- Advances in graphene technology have spurred the synthesis of various 2D nanomaterials.</a:t>
-            </a:r>
-          </a:p>
-          <a:p>
-            <a:r>
-              <a:t>- Transition metal oxides, metal chalcogenides, and organic compounds are key focus areas.</a:t>
-            </a:r>
-          </a:p>
-          <a:p>
-            <a:r>
-              <a:t>- Simple and effective synthetic methods are still being pursued.</a:t>
+              <a:t>- Overview of In4SnS8 nanosheets</a:t>
+            </a:r>
+          </a:p>
+          <a:p>
+            <a:r>
+              <a:t>- Applications in environmental remediation, solar energy conversion, and advanced nanodevices</a:t>
+            </a:r>
+          </a:p>
+          <a:p>
+            <a:r>
+              <a:t>- Importance in nanotechnology and material science</a:t>
             </a:r>
           </a:p>
         </p:txBody>
@@ -3180,7 +3180,7 @@
           <a:lstStyle/>
           <a:p>
             <a:r>
-              <a:t>Synthesis Methods for 2D Nanomaterials</a:t>
+              <a:t>Synthesis of In4SnS8 Nanosheets</a:t>
             </a:r>
           </a:p>
         </p:txBody>
@@ -3201,17 +3201,17 @@
           <a:lstStyle/>
           <a:p>
             <a:r>
-              <a:t>- Mechanical and liquid-phase exfoliations.</a:t>
-            </a:r>
-          </a:p>
-          <a:p>
-            <a:r>
-              <a:t>- Ion-intercalation and exfoliation.</a:t>
-            </a:r>
-          </a:p>
-          <a:p>
-            <a:r>
-              <a:t>- Chemical vapor deposition (CVD) and solution-phase chemical syntheses.</a:t>
+              <a:t>- Synthesized via a thermal decomposition method</a:t>
+            </a:r>
+          </a:p>
+          <a:p>
+            <a:r>
+              <a:t>- Utilizes Sn(DDTC)4 and In(DDTC)3 in oleylamine solvent</a:t>
+            </a:r>
+          </a:p>
+          <a:p>
+            <a:r>
+              <a:t>- Heating process: 120°C under vacuum, followed by 240°C under N2 atmosphere</a:t>
             </a:r>
           </a:p>
         </p:txBody>
@@ -3271,17 +3271,17 @@
           <a:lstStyle/>
           <a:p>
             <a:r>
-              <a:t>- Morphology examined using Tecnai G2 F30 S-Twin transmission electron microscope.</a:t>
-            </a:r>
-          </a:p>
-          <a:p>
-            <a:r>
-              <a:t>- X-ray diffraction patterns recorded with Bruker D8 Advance powder X-ray diffractometer.</a:t>
-            </a:r>
-          </a:p>
-          <a:p>
-            <a:r>
-              <a:t>- X-ray photoelectron spectra using PHI 5000 Versaprobe spectrometer.</a:t>
+              <a:t>- Morphology examined using TEM (Tecnai G2 F30 S-Twin)</a:t>
+            </a:r>
+          </a:p>
+          <a:p>
+            <a:r>
+              <a:t>- XRD patterns for structural analysis (Bruker D8 Advance)</a:t>
+            </a:r>
+          </a:p>
+          <a:p>
+            <a:r>
+              <a:t>- XPS for elemental composition (PHI 5000 Versaprobe)</a:t>
             </a:r>
           </a:p>
         </p:txBody>
@@ -3320,7 +3320,7 @@
           <a:lstStyle/>
           <a:p>
             <a:r>
-              <a:t>Synthesis of In4SnS8 Nanosheets</a:t>
+              <a:t>Properties of In4SnS8 Nanosheets</a:t>
             </a:r>
           </a:p>
         </p:txBody>
@@ -3341,17 +3341,17 @@
           <a:lstStyle/>
           <a:p>
             <a:r>
-              <a:t>- Synthesized via a thermal decomposition method.</a:t>
-            </a:r>
-          </a:p>
-          <a:p>
-            <a:r>
-              <a:t>- Utilized Sn(DDTC)4 and In(DDTC)3 in OM solvent.</a:t>
-            </a:r>
-          </a:p>
-          <a:p>
-            <a:r>
-              <a:t>- Temperature control and N2 atmosphere critical in synthesis.</a:t>
+              <a:t>- Ultrathin nature with an average thickness of 3.8 nm</a:t>
+            </a:r>
+          </a:p>
+          <a:p>
+            <a:r>
+              <a:t>- Comprises five atomically thick layers</a:t>
+            </a:r>
+          </a:p>
+          <a:p>
+            <a:r>
+              <a:t>- Large specific surface area of 40.34 m²/g</a:t>
             </a:r>
           </a:p>
         </p:txBody>
@@ -3390,7 +3390,7 @@
           <a:lstStyle/>
           <a:p>
             <a:r>
-              <a:t>Adsorption and Photocatalysis Applications</a:t>
+              <a:t>Photocatalytic Efficiency</a:t>
             </a:r>
           </a:p>
         </p:txBody>
@@ -3411,17 +3411,17 @@
           <a:lstStyle/>
           <a:p>
             <a:r>
-              <a:t>- In4SnS8 nanosheets treated in acetic acid for surface preparation.</a:t>
-            </a:r>
-          </a:p>
-          <a:p>
-            <a:r>
-              <a:t>- Exhibits fast adsorption and photocatalytic dual function.</a:t>
-            </a:r>
-          </a:p>
-          <a:p>
-            <a:r>
-              <a:t>- Effective for organic dye removal in environmental remediation.</a:t>
+              <a:t>- Fast adsorption-visible-light photocatalysis dual function</a:t>
+            </a:r>
+          </a:p>
+          <a:p>
+            <a:r>
+              <a:t>- Effective for various organic dyes removal</a:t>
+            </a:r>
+          </a:p>
+          <a:p>
+            <a:r>
+              <a:t>- Potential for solar energy conversion and environmental remediation</a:t>
             </a:r>
           </a:p>
         </p:txBody>
@@ -3460,7 +3460,7 @@
           <a:lstStyle/>
           <a:p>
             <a:r>
-              <a:t>Performance and Efficiency</a:t>
+              <a:t>Comparative Analysis</a:t>
             </a:r>
           </a:p>
         </p:txBody>
@@ -3481,17 +3481,12 @@
           <a:lstStyle/>
           <a:p>
             <a:r>
-              <a:t>- High specific surface area of 40.34 m2 g⁻¹.</a:t>
-            </a:r>
-          </a:p>
-          <a:p>
-            <a:r>
-              <a:t>- Superior to flower-like In4SnS8 microspheres with 24.7 m2 g⁻¹.</a:t>
-            </a:r>
-          </a:p>
-          <a:p>
-            <a:r>
-              <a:t>- Large surface area enhances photocatalytic applications.</a:t>
+              <a:t>- Higher efficiency compared to other structures like In4SnS8 microspheres</a:t>
+            </a:r>
+          </a:p>
+          <a:p>
+            <a:r>
+              <a:t>- Specific surface area significantly larger than flower-like microspheres (24.7 m²/g)</a:t>
             </a:r>
           </a:p>
         </p:txBody>
@@ -3530,7 +3525,7 @@
           <a:lstStyle/>
           <a:p>
             <a:r>
-              <a:t>Conclusion and Future Prospects</a:t>
+              <a:t>Conclusion and Future Directions</a:t>
             </a:r>
           </a:p>
         </p:txBody>
@@ -3551,17 +3546,17 @@
           <a:lstStyle/>
           <a:p>
             <a:r>
-              <a:t>- In4SnS8 nanosheets hold potential for environmental remediation and solar energy conversion.</a:t>
-            </a:r>
-          </a:p>
-          <a:p>
-            <a:r>
-              <a:t>- Ongoing research focuses on optimizing synthesis methods and improving efficiency.</a:t>
-            </a:r>
-          </a:p>
-          <a:p>
-            <a:r>
-              <a:t>- Potential applications in advanced optical/electric nanodevices.</a:t>
+              <a:t>- Promising advances in 2D nanomaterials</a:t>
+            </a:r>
+          </a:p>
+          <a:p>
+            <a:r>
+              <a:t>- Potential applications in environmental and energy sectors</a:t>
+            </a:r>
+          </a:p>
+          <a:p>
+            <a:r>
+              <a:t>- Continued research to optimize synthesis and application methods</a:t>
             </a:r>
           </a:p>
         </p:txBody>

</xml_diff>